<commit_message>
TCP vs OSI page is added to pptx
</commit_message>
<xml_diff>
--- a/Network/NetworkAdem.pptx
+++ b/Network/NetworkAdem.pptx
@@ -14,6 +14,7 @@
     <p:sldId id="262" r:id="rId8"/>
     <p:sldId id="263" r:id="rId9"/>
     <p:sldId id="264" r:id="rId10"/>
+    <p:sldId id="265" r:id="rId11"/>
   </p:sldIdLst>
   <p:sldSz cx="12192000" cy="6858000"/>
   <p:notesSz cx="6858000" cy="9144000"/>
@@ -3049,6 +3050,93 @@
 </p:sld>
 </file>
 
+<file path=ppt/slides/slide10.xml><?xml version="1.0" encoding="utf-8"?>
+<p:sld xmlns:a="http://schemas.openxmlformats.org/drawingml/2006/main" xmlns:r="http://schemas.openxmlformats.org/officeDocument/2006/relationships" xmlns:p="http://schemas.openxmlformats.org/presentationml/2006/main">
+  <p:cSld>
+    <p:spTree>
+      <p:nvGrpSpPr>
+        <p:cNvPr id="1" name=""/>
+        <p:cNvGrpSpPr/>
+        <p:nvPr/>
+      </p:nvGrpSpPr>
+      <p:grpSpPr>
+        <a:xfrm>
+          <a:off x="0" y="0"/>
+          <a:ext cx="0" cy="0"/>
+          <a:chOff x="0" y="0"/>
+          <a:chExt cx="0" cy="0"/>
+        </a:xfrm>
+      </p:grpSpPr>
+      <p:sp>
+        <p:nvSpPr>
+          <p:cNvPr id="2" name="Unvan 1"/>
+          <p:cNvSpPr>
+            <a:spLocks noGrp="1"/>
+          </p:cNvSpPr>
+          <p:nvPr>
+            <p:ph type="title"/>
+          </p:nvPr>
+        </p:nvSpPr>
+        <p:spPr/>
+        <p:txBody>
+          <a:bodyPr/>
+          <a:lstStyle/>
+          <a:p>
+            <a:r>
+              <a:rPr lang="tr-TR" dirty="0" smtClean="0"/>
+              <a:t>TCP/IP </a:t>
+            </a:r>
+            <a:r>
+              <a:rPr lang="tr-TR" dirty="0" err="1" smtClean="0"/>
+              <a:t>vs</a:t>
+            </a:r>
+            <a:r>
+              <a:rPr lang="tr-TR" dirty="0" smtClean="0"/>
+              <a:t> OSI</a:t>
+            </a:r>
+            <a:endParaRPr lang="tr-TR" dirty="0"/>
+          </a:p>
+        </p:txBody>
+      </p:sp>
+      <p:pic>
+        <p:nvPicPr>
+          <p:cNvPr id="4" name="İçerik Yer Tutucusu 3"/>
+          <p:cNvPicPr>
+            <a:picLocks noGrp="1" noChangeAspect="1"/>
+          </p:cNvPicPr>
+          <p:nvPr>
+            <p:ph idx="1"/>
+          </p:nvPr>
+        </p:nvPicPr>
+        <p:blipFill>
+          <a:blip r:embed="rId2"/>
+          <a:stretch>
+            <a:fillRect/>
+          </a:stretch>
+        </p:blipFill>
+        <p:spPr>
+          <a:xfrm>
+            <a:off x="1333500" y="2067719"/>
+            <a:ext cx="9525000" cy="3867150"/>
+          </a:xfrm>
+          <a:prstGeom prst="rect">
+            <a:avLst/>
+          </a:prstGeom>
+        </p:spPr>
+      </p:pic>
+    </p:spTree>
+    <p:extLst>
+      <p:ext uri="{BB962C8B-B14F-4D97-AF65-F5344CB8AC3E}">
+        <p14:creationId xmlns:p14="http://schemas.microsoft.com/office/powerpoint/2010/main" val="242569969"/>
+      </p:ext>
+    </p:extLst>
+  </p:cSld>
+  <p:clrMapOvr>
+    <a:masterClrMapping/>
+  </p:clrMapOvr>
+</p:sld>
+</file>
+
 <file path=ppt/slides/slide2.xml><?xml version="1.0" encoding="utf-8"?>
 <p:sld xmlns:a="http://schemas.openxmlformats.org/drawingml/2006/main" xmlns:r="http://schemas.openxmlformats.org/officeDocument/2006/relationships" xmlns:p="http://schemas.openxmlformats.org/presentationml/2006/main">
   <p:cSld>

</xml_diff>

<commit_message>
new pages are added
</commit_message>
<xml_diff>
--- a/Network/NetworkAdem.pptx
+++ b/Network/NetworkAdem.pptx
@@ -15,6 +15,8 @@
     <p:sldId id="263" r:id="rId9"/>
     <p:sldId id="264" r:id="rId10"/>
     <p:sldId id="265" r:id="rId11"/>
+    <p:sldId id="266" r:id="rId12"/>
+    <p:sldId id="267" r:id="rId13"/>
   </p:sldIdLst>
   <p:sldSz cx="12192000" cy="6858000"/>
   <p:notesSz cx="6858000" cy="9144000"/>
@@ -252,7 +254,7 @@
           <a:p>
             <a:fld id="{F6A76FFB-7BA4-4E7E-8C1A-F77C0C1EFE9B}" type="datetimeFigureOut">
               <a:rPr lang="tr-TR" smtClean="0"/>
-              <a:t>11.10.2022</a:t>
+              <a:t>13.10.2022</a:t>
             </a:fld>
             <a:endParaRPr lang="tr-TR"/>
           </a:p>
@@ -422,7 +424,7 @@
           <a:p>
             <a:fld id="{F6A76FFB-7BA4-4E7E-8C1A-F77C0C1EFE9B}" type="datetimeFigureOut">
               <a:rPr lang="tr-TR" smtClean="0"/>
-              <a:t>11.10.2022</a:t>
+              <a:t>13.10.2022</a:t>
             </a:fld>
             <a:endParaRPr lang="tr-TR"/>
           </a:p>
@@ -602,7 +604,7 @@
           <a:p>
             <a:fld id="{F6A76FFB-7BA4-4E7E-8C1A-F77C0C1EFE9B}" type="datetimeFigureOut">
               <a:rPr lang="tr-TR" smtClean="0"/>
-              <a:t>11.10.2022</a:t>
+              <a:t>13.10.2022</a:t>
             </a:fld>
             <a:endParaRPr lang="tr-TR"/>
           </a:p>
@@ -772,7 +774,7 @@
           <a:p>
             <a:fld id="{F6A76FFB-7BA4-4E7E-8C1A-F77C0C1EFE9B}" type="datetimeFigureOut">
               <a:rPr lang="tr-TR" smtClean="0"/>
-              <a:t>11.10.2022</a:t>
+              <a:t>13.10.2022</a:t>
             </a:fld>
             <a:endParaRPr lang="tr-TR"/>
           </a:p>
@@ -1018,7 +1020,7 @@
           <a:p>
             <a:fld id="{F6A76FFB-7BA4-4E7E-8C1A-F77C0C1EFE9B}" type="datetimeFigureOut">
               <a:rPr lang="tr-TR" smtClean="0"/>
-              <a:t>11.10.2022</a:t>
+              <a:t>13.10.2022</a:t>
             </a:fld>
             <a:endParaRPr lang="tr-TR"/>
           </a:p>
@@ -1250,7 +1252,7 @@
           <a:p>
             <a:fld id="{F6A76FFB-7BA4-4E7E-8C1A-F77C0C1EFE9B}" type="datetimeFigureOut">
               <a:rPr lang="tr-TR" smtClean="0"/>
-              <a:t>11.10.2022</a:t>
+              <a:t>13.10.2022</a:t>
             </a:fld>
             <a:endParaRPr lang="tr-TR"/>
           </a:p>
@@ -1617,7 +1619,7 @@
           <a:p>
             <a:fld id="{F6A76FFB-7BA4-4E7E-8C1A-F77C0C1EFE9B}" type="datetimeFigureOut">
               <a:rPr lang="tr-TR" smtClean="0"/>
-              <a:t>11.10.2022</a:t>
+              <a:t>13.10.2022</a:t>
             </a:fld>
             <a:endParaRPr lang="tr-TR"/>
           </a:p>
@@ -1735,7 +1737,7 @@
           <a:p>
             <a:fld id="{F6A76FFB-7BA4-4E7E-8C1A-F77C0C1EFE9B}" type="datetimeFigureOut">
               <a:rPr lang="tr-TR" smtClean="0"/>
-              <a:t>11.10.2022</a:t>
+              <a:t>13.10.2022</a:t>
             </a:fld>
             <a:endParaRPr lang="tr-TR"/>
           </a:p>
@@ -1830,7 +1832,7 @@
           <a:p>
             <a:fld id="{F6A76FFB-7BA4-4E7E-8C1A-F77C0C1EFE9B}" type="datetimeFigureOut">
               <a:rPr lang="tr-TR" smtClean="0"/>
-              <a:t>11.10.2022</a:t>
+              <a:t>13.10.2022</a:t>
             </a:fld>
             <a:endParaRPr lang="tr-TR"/>
           </a:p>
@@ -2107,7 +2109,7 @@
           <a:p>
             <a:fld id="{F6A76FFB-7BA4-4E7E-8C1A-F77C0C1EFE9B}" type="datetimeFigureOut">
               <a:rPr lang="tr-TR" smtClean="0"/>
-              <a:t>11.10.2022</a:t>
+              <a:t>13.10.2022</a:t>
             </a:fld>
             <a:endParaRPr lang="tr-TR"/>
           </a:p>
@@ -2360,7 +2362,7 @@
           <a:p>
             <a:fld id="{F6A76FFB-7BA4-4E7E-8C1A-F77C0C1EFE9B}" type="datetimeFigureOut">
               <a:rPr lang="tr-TR" smtClean="0"/>
-              <a:t>11.10.2022</a:t>
+              <a:t>13.10.2022</a:t>
             </a:fld>
             <a:endParaRPr lang="tr-TR"/>
           </a:p>
@@ -2573,7 +2575,7 @@
           <a:p>
             <a:fld id="{F6A76FFB-7BA4-4E7E-8C1A-F77C0C1EFE9B}" type="datetimeFigureOut">
               <a:rPr lang="tr-TR" smtClean="0"/>
-              <a:t>11.10.2022</a:t>
+              <a:t>13.10.2022</a:t>
             </a:fld>
             <a:endParaRPr lang="tr-TR"/>
           </a:p>
@@ -3124,10 +3126,212 @@
           </a:prstGeom>
         </p:spPr>
       </p:pic>
+      <p:sp>
+        <p:nvSpPr>
+          <p:cNvPr id="6" name="Metin kutusu 5"/>
+          <p:cNvSpPr txBox="1"/>
+          <p:nvPr/>
+        </p:nvSpPr>
+        <p:spPr>
+          <a:xfrm>
+            <a:off x="4045527" y="4350327"/>
+            <a:ext cx="1847273" cy="369332"/>
+          </a:xfrm>
+          <a:prstGeom prst="rect">
+            <a:avLst/>
+          </a:prstGeom>
+          <a:noFill/>
+        </p:spPr>
+        <p:txBody>
+          <a:bodyPr wrap="square" rtlCol="0">
+            <a:spAutoFit/>
+          </a:bodyPr>
+          <a:lstStyle/>
+          <a:p>
+            <a:r>
+              <a:rPr lang="tr-TR" dirty="0" smtClean="0"/>
+              <a:t>Internet Protocol</a:t>
+            </a:r>
+            <a:endParaRPr lang="tr-TR" dirty="0"/>
+          </a:p>
+        </p:txBody>
+      </p:sp>
     </p:spTree>
     <p:extLst>
       <p:ext uri="{BB962C8B-B14F-4D97-AF65-F5344CB8AC3E}">
         <p14:creationId xmlns:p14="http://schemas.microsoft.com/office/powerpoint/2010/main" val="242569969"/>
+      </p:ext>
+    </p:extLst>
+  </p:cSld>
+  <p:clrMapOvr>
+    <a:masterClrMapping/>
+  </p:clrMapOvr>
+</p:sld>
+</file>
+
+<file path=ppt/slides/slide11.xml><?xml version="1.0" encoding="utf-8"?>
+<p:sld xmlns:a="http://schemas.openxmlformats.org/drawingml/2006/main" xmlns:r="http://schemas.openxmlformats.org/officeDocument/2006/relationships" xmlns:p="http://schemas.openxmlformats.org/presentationml/2006/main">
+  <p:cSld>
+    <p:spTree>
+      <p:nvGrpSpPr>
+        <p:cNvPr id="1" name=""/>
+        <p:cNvGrpSpPr/>
+        <p:nvPr/>
+      </p:nvGrpSpPr>
+      <p:grpSpPr>
+        <a:xfrm>
+          <a:off x="0" y="0"/>
+          <a:ext cx="0" cy="0"/>
+          <a:chOff x="0" y="0"/>
+          <a:chExt cx="0" cy="0"/>
+        </a:xfrm>
+      </p:grpSpPr>
+      <p:sp>
+        <p:nvSpPr>
+          <p:cNvPr id="2" name="Unvan 1"/>
+          <p:cNvSpPr>
+            <a:spLocks noGrp="1"/>
+          </p:cNvSpPr>
+          <p:nvPr>
+            <p:ph type="title"/>
+          </p:nvPr>
+        </p:nvSpPr>
+        <p:spPr/>
+        <p:txBody>
+          <a:bodyPr/>
+          <a:lstStyle/>
+          <a:p>
+            <a:r>
+              <a:rPr lang="tr-TR" dirty="0" smtClean="0"/>
+              <a:t>NAT (Network </a:t>
+            </a:r>
+            <a:r>
+              <a:rPr lang="tr-TR" dirty="0" err="1" smtClean="0"/>
+              <a:t>Address</a:t>
+            </a:r>
+            <a:r>
+              <a:rPr lang="tr-TR" dirty="0" smtClean="0"/>
+              <a:t> </a:t>
+            </a:r>
+            <a:r>
+              <a:rPr lang="tr-TR" dirty="0" err="1" smtClean="0"/>
+              <a:t>Translation</a:t>
+            </a:r>
+            <a:r>
+              <a:rPr lang="tr-TR" dirty="0" smtClean="0"/>
+              <a:t>)	</a:t>
+            </a:r>
+            <a:endParaRPr lang="tr-TR" dirty="0"/>
+          </a:p>
+        </p:txBody>
+      </p:sp>
+      <p:sp>
+        <p:nvSpPr>
+          <p:cNvPr id="3" name="İçerik Yer Tutucusu 2"/>
+          <p:cNvSpPr>
+            <a:spLocks noGrp="1"/>
+          </p:cNvSpPr>
+          <p:nvPr>
+            <p:ph idx="1"/>
+          </p:nvPr>
+        </p:nvSpPr>
+        <p:spPr/>
+        <p:txBody>
+          <a:bodyPr>
+            <a:normAutofit/>
+          </a:bodyPr>
+          <a:lstStyle/>
+          <a:p>
+            <a:endParaRPr lang="tr-TR" sz="2400" dirty="0" smtClean="0"/>
+          </a:p>
+          <a:p>
+            <a:endParaRPr lang="tr-TR" sz="2400" dirty="0"/>
+          </a:p>
+          <a:p>
+            <a:r>
+              <a:rPr lang="tr-TR" sz="2400" dirty="0" smtClean="0"/>
+              <a:t>T</a:t>
+            </a:r>
+            <a:r>
+              <a:rPr lang="en-US" sz="2400" dirty="0"/>
+              <a:t>o access the Internet, one public IP address is needed, but we can use a private IP address in our private network. The idea of NAT is to allow multiple devices to access the Internet through a single public address. To achieve this, the translation of a private IP address to a public IP address is required. Network Address Translation (NAT) is a process in which one or more local IP address is translated into one or more Global IP address and vice versa in order to provide Internet access to the local hosts.</a:t>
+            </a:r>
+            <a:endParaRPr lang="tr-TR" sz="2400" dirty="0"/>
+          </a:p>
+        </p:txBody>
+      </p:sp>
+    </p:spTree>
+    <p:extLst>
+      <p:ext uri="{BB962C8B-B14F-4D97-AF65-F5344CB8AC3E}">
+        <p14:creationId xmlns:p14="http://schemas.microsoft.com/office/powerpoint/2010/main" val="3742963375"/>
+      </p:ext>
+    </p:extLst>
+  </p:cSld>
+  <p:clrMapOvr>
+    <a:masterClrMapping/>
+  </p:clrMapOvr>
+</p:sld>
+</file>
+
+<file path=ppt/slides/slide12.xml><?xml version="1.0" encoding="utf-8"?>
+<p:sld xmlns:a="http://schemas.openxmlformats.org/drawingml/2006/main" xmlns:r="http://schemas.openxmlformats.org/officeDocument/2006/relationships" xmlns:p="http://schemas.openxmlformats.org/presentationml/2006/main">
+  <p:cSld>
+    <p:spTree>
+      <p:nvGrpSpPr>
+        <p:cNvPr id="1" name=""/>
+        <p:cNvGrpSpPr/>
+        <p:nvPr/>
+      </p:nvGrpSpPr>
+      <p:grpSpPr>
+        <a:xfrm>
+          <a:off x="0" y="0"/>
+          <a:ext cx="0" cy="0"/>
+          <a:chOff x="0" y="0"/>
+          <a:chExt cx="0" cy="0"/>
+        </a:xfrm>
+      </p:grpSpPr>
+      <p:sp>
+        <p:nvSpPr>
+          <p:cNvPr id="2" name="Unvan 1"/>
+          <p:cNvSpPr>
+            <a:spLocks noGrp="1"/>
+          </p:cNvSpPr>
+          <p:nvPr>
+            <p:ph type="title"/>
+          </p:nvPr>
+        </p:nvSpPr>
+        <p:spPr/>
+        <p:txBody>
+          <a:bodyPr/>
+          <a:lstStyle/>
+          <a:p>
+            <a:endParaRPr lang="tr-TR"/>
+          </a:p>
+        </p:txBody>
+      </p:sp>
+      <p:sp>
+        <p:nvSpPr>
+          <p:cNvPr id="3" name="İçerik Yer Tutucusu 2"/>
+          <p:cNvSpPr>
+            <a:spLocks noGrp="1"/>
+          </p:cNvSpPr>
+          <p:nvPr>
+            <p:ph idx="1"/>
+          </p:nvPr>
+        </p:nvSpPr>
+        <p:spPr/>
+        <p:txBody>
+          <a:bodyPr/>
+          <a:lstStyle/>
+          <a:p>
+            <a:endParaRPr lang="tr-TR"/>
+          </a:p>
+        </p:txBody>
+      </p:sp>
+    </p:spTree>
+    <p:extLst>
+      <p:ext uri="{BB962C8B-B14F-4D97-AF65-F5344CB8AC3E}">
+        <p14:creationId xmlns:p14="http://schemas.microsoft.com/office/powerpoint/2010/main" val="3103689851"/>
       </p:ext>
     </p:extLst>
   </p:cSld>

</xml_diff>

<commit_message>
Cisco Package Tracer exercises are added
</commit_message>
<xml_diff>
--- a/Network/NetworkAdem.pptx
+++ b/Network/NetworkAdem.pptx
@@ -253,7 +253,7 @@
           <a:p>
             <a:fld id="{F6A76FFB-7BA4-4E7E-8C1A-F77C0C1EFE9B}" type="datetimeFigureOut">
               <a:rPr lang="tr-TR" smtClean="0"/>
-              <a:t>24.10.2022</a:t>
+              <a:t>25.10.2022</a:t>
             </a:fld>
             <a:endParaRPr lang="tr-TR"/>
           </a:p>
@@ -423,7 +423,7 @@
           <a:p>
             <a:fld id="{F6A76FFB-7BA4-4E7E-8C1A-F77C0C1EFE9B}" type="datetimeFigureOut">
               <a:rPr lang="tr-TR" smtClean="0"/>
-              <a:t>24.10.2022</a:t>
+              <a:t>25.10.2022</a:t>
             </a:fld>
             <a:endParaRPr lang="tr-TR"/>
           </a:p>
@@ -603,7 +603,7 @@
           <a:p>
             <a:fld id="{F6A76FFB-7BA4-4E7E-8C1A-F77C0C1EFE9B}" type="datetimeFigureOut">
               <a:rPr lang="tr-TR" smtClean="0"/>
-              <a:t>24.10.2022</a:t>
+              <a:t>25.10.2022</a:t>
             </a:fld>
             <a:endParaRPr lang="tr-TR"/>
           </a:p>
@@ -773,7 +773,7 @@
           <a:p>
             <a:fld id="{F6A76FFB-7BA4-4E7E-8C1A-F77C0C1EFE9B}" type="datetimeFigureOut">
               <a:rPr lang="tr-TR" smtClean="0"/>
-              <a:t>24.10.2022</a:t>
+              <a:t>25.10.2022</a:t>
             </a:fld>
             <a:endParaRPr lang="tr-TR"/>
           </a:p>
@@ -1019,7 +1019,7 @@
           <a:p>
             <a:fld id="{F6A76FFB-7BA4-4E7E-8C1A-F77C0C1EFE9B}" type="datetimeFigureOut">
               <a:rPr lang="tr-TR" smtClean="0"/>
-              <a:t>24.10.2022</a:t>
+              <a:t>25.10.2022</a:t>
             </a:fld>
             <a:endParaRPr lang="tr-TR"/>
           </a:p>
@@ -1251,7 +1251,7 @@
           <a:p>
             <a:fld id="{F6A76FFB-7BA4-4E7E-8C1A-F77C0C1EFE9B}" type="datetimeFigureOut">
               <a:rPr lang="tr-TR" smtClean="0"/>
-              <a:t>24.10.2022</a:t>
+              <a:t>25.10.2022</a:t>
             </a:fld>
             <a:endParaRPr lang="tr-TR"/>
           </a:p>
@@ -1618,7 +1618,7 @@
           <a:p>
             <a:fld id="{F6A76FFB-7BA4-4E7E-8C1A-F77C0C1EFE9B}" type="datetimeFigureOut">
               <a:rPr lang="tr-TR" smtClean="0"/>
-              <a:t>24.10.2022</a:t>
+              <a:t>25.10.2022</a:t>
             </a:fld>
             <a:endParaRPr lang="tr-TR"/>
           </a:p>
@@ -1736,7 +1736,7 @@
           <a:p>
             <a:fld id="{F6A76FFB-7BA4-4E7E-8C1A-F77C0C1EFE9B}" type="datetimeFigureOut">
               <a:rPr lang="tr-TR" smtClean="0"/>
-              <a:t>24.10.2022</a:t>
+              <a:t>25.10.2022</a:t>
             </a:fld>
             <a:endParaRPr lang="tr-TR"/>
           </a:p>
@@ -1831,7 +1831,7 @@
           <a:p>
             <a:fld id="{F6A76FFB-7BA4-4E7E-8C1A-F77C0C1EFE9B}" type="datetimeFigureOut">
               <a:rPr lang="tr-TR" smtClean="0"/>
-              <a:t>24.10.2022</a:t>
+              <a:t>25.10.2022</a:t>
             </a:fld>
             <a:endParaRPr lang="tr-TR"/>
           </a:p>
@@ -2108,7 +2108,7 @@
           <a:p>
             <a:fld id="{F6A76FFB-7BA4-4E7E-8C1A-F77C0C1EFE9B}" type="datetimeFigureOut">
               <a:rPr lang="tr-TR" smtClean="0"/>
-              <a:t>24.10.2022</a:t>
+              <a:t>25.10.2022</a:t>
             </a:fld>
             <a:endParaRPr lang="tr-TR"/>
           </a:p>
@@ -2361,7 +2361,7 @@
           <a:p>
             <a:fld id="{F6A76FFB-7BA4-4E7E-8C1A-F77C0C1EFE9B}" type="datetimeFigureOut">
               <a:rPr lang="tr-TR" smtClean="0"/>
-              <a:t>24.10.2022</a:t>
+              <a:t>25.10.2022</a:t>
             </a:fld>
             <a:endParaRPr lang="tr-TR"/>
           </a:p>
@@ -2574,7 +2574,7 @@
           <a:p>
             <a:fld id="{F6A76FFB-7BA4-4E7E-8C1A-F77C0C1EFE9B}" type="datetimeFigureOut">
               <a:rPr lang="tr-TR" smtClean="0"/>
-              <a:t>24.10.2022</a:t>
+              <a:t>25.10.2022</a:t>
             </a:fld>
             <a:endParaRPr lang="tr-TR"/>
           </a:p>

</xml_diff>